<commit_message>
Remove the PS instruction.
</commit_message>
<xml_diff>
--- a/lectures/05-Software.pptx
+++ b/lectures/05-Software.pptx
@@ -5,7 +5,7 @@
     <p:sldMasterId id="2147483648" r:id="rId1"/>
   </p:sldMasterIdLst>
   <p:notesMasterIdLst>
-    <p:notesMasterId r:id="rId12"/>
+    <p:notesMasterId r:id="rId21"/>
   </p:notesMasterIdLst>
   <p:sldIdLst>
     <p:sldId id="256" r:id="rId2"/>
@@ -17,7 +17,16 @@
     <p:sldId id="337" r:id="rId8"/>
     <p:sldId id="332" r:id="rId9"/>
     <p:sldId id="327" r:id="rId10"/>
-    <p:sldId id="338" r:id="rId11"/>
+    <p:sldId id="339" r:id="rId11"/>
+    <p:sldId id="338" r:id="rId12"/>
+    <p:sldId id="340" r:id="rId13"/>
+    <p:sldId id="343" r:id="rId14"/>
+    <p:sldId id="344" r:id="rId15"/>
+    <p:sldId id="342" r:id="rId16"/>
+    <p:sldId id="345" r:id="rId17"/>
+    <p:sldId id="341" r:id="rId18"/>
+    <p:sldId id="346" r:id="rId19"/>
+    <p:sldId id="347" r:id="rId20"/>
   </p:sldIdLst>
   <p:sldSz cx="12192000" cy="6858000"/>
   <p:notesSz cx="6858000" cy="9144000"/>
@@ -206,7 +215,7 @@
           <a:p>
             <a:fld id="{1C74C8C0-0C1E-D447-A6DA-5BF9E732D1EF}" type="datetimeFigureOut">
               <a:rPr lang="en-US" smtClean="0"/>
-              <a:t>9/23/25</a:t>
+              <a:t>11/19/25</a:t>
             </a:fld>
             <a:endParaRPr lang="en-US"/>
           </a:p>
@@ -704,7 +713,7 @@
           <a:p>
             <a:fld id="{D5D8E255-8371-B349-B2F5-F8C6C9FF431B}" type="datetimeFigureOut">
               <a:rPr lang="en-US" smtClean="0"/>
-              <a:t>9/23/25</a:t>
+              <a:t>11/19/25</a:t>
             </a:fld>
             <a:endParaRPr lang="en-US"/>
           </a:p>
@@ -902,7 +911,7 @@
           <a:p>
             <a:fld id="{D5D8E255-8371-B349-B2F5-F8C6C9FF431B}" type="datetimeFigureOut">
               <a:rPr lang="en-US" smtClean="0"/>
-              <a:t>9/23/25</a:t>
+              <a:t>11/19/25</a:t>
             </a:fld>
             <a:endParaRPr lang="en-US"/>
           </a:p>
@@ -1110,7 +1119,7 @@
           <a:p>
             <a:fld id="{D5D8E255-8371-B349-B2F5-F8C6C9FF431B}" type="datetimeFigureOut">
               <a:rPr lang="en-US" smtClean="0"/>
-              <a:t>9/23/25</a:t>
+              <a:t>11/19/25</a:t>
             </a:fld>
             <a:endParaRPr lang="en-US"/>
           </a:p>
@@ -1308,7 +1317,7 @@
           <a:p>
             <a:fld id="{D5D8E255-8371-B349-B2F5-F8C6C9FF431B}" type="datetimeFigureOut">
               <a:rPr lang="en-US" smtClean="0"/>
-              <a:t>9/23/25</a:t>
+              <a:t>11/19/25</a:t>
             </a:fld>
             <a:endParaRPr lang="en-US"/>
           </a:p>
@@ -1583,7 +1592,7 @@
           <a:p>
             <a:fld id="{D5D8E255-8371-B349-B2F5-F8C6C9FF431B}" type="datetimeFigureOut">
               <a:rPr lang="en-US" smtClean="0"/>
-              <a:t>9/23/25</a:t>
+              <a:t>11/19/25</a:t>
             </a:fld>
             <a:endParaRPr lang="en-US"/>
           </a:p>
@@ -1848,7 +1857,7 @@
           <a:p>
             <a:fld id="{D5D8E255-8371-B349-B2F5-F8C6C9FF431B}" type="datetimeFigureOut">
               <a:rPr lang="en-US" smtClean="0"/>
-              <a:t>9/23/25</a:t>
+              <a:t>11/19/25</a:t>
             </a:fld>
             <a:endParaRPr lang="en-US"/>
           </a:p>
@@ -2260,7 +2269,7 @@
           <a:p>
             <a:fld id="{D5D8E255-8371-B349-B2F5-F8C6C9FF431B}" type="datetimeFigureOut">
               <a:rPr lang="en-US" smtClean="0"/>
-              <a:t>9/23/25</a:t>
+              <a:t>11/19/25</a:t>
             </a:fld>
             <a:endParaRPr lang="en-US"/>
           </a:p>
@@ -2401,7 +2410,7 @@
           <a:p>
             <a:fld id="{D5D8E255-8371-B349-B2F5-F8C6C9FF431B}" type="datetimeFigureOut">
               <a:rPr lang="en-US" smtClean="0"/>
-              <a:t>9/23/25</a:t>
+              <a:t>11/19/25</a:t>
             </a:fld>
             <a:endParaRPr lang="en-US"/>
           </a:p>
@@ -2514,7 +2523,7 @@
           <a:p>
             <a:fld id="{D5D8E255-8371-B349-B2F5-F8C6C9FF431B}" type="datetimeFigureOut">
               <a:rPr lang="en-US" smtClean="0"/>
-              <a:t>9/23/25</a:t>
+              <a:t>11/19/25</a:t>
             </a:fld>
             <a:endParaRPr lang="en-US"/>
           </a:p>
@@ -2825,7 +2834,7 @@
           <a:p>
             <a:fld id="{D5D8E255-8371-B349-B2F5-F8C6C9FF431B}" type="datetimeFigureOut">
               <a:rPr lang="en-US" smtClean="0"/>
-              <a:t>9/23/25</a:t>
+              <a:t>11/19/25</a:t>
             </a:fld>
             <a:endParaRPr lang="en-US"/>
           </a:p>
@@ -3113,7 +3122,7 @@
           <a:p>
             <a:fld id="{D5D8E255-8371-B349-B2F5-F8C6C9FF431B}" type="datetimeFigureOut">
               <a:rPr lang="en-US" smtClean="0"/>
-              <a:t>9/23/25</a:t>
+              <a:t>11/19/25</a:t>
             </a:fld>
             <a:endParaRPr lang="en-US"/>
           </a:p>
@@ -3354,7 +3363,7 @@
           <a:p>
             <a:fld id="{D5D8E255-8371-B349-B2F5-F8C6C9FF431B}" type="datetimeFigureOut">
               <a:rPr lang="en-US" smtClean="0"/>
-              <a:t>9/23/25</a:t>
+              <a:t>11/19/25</a:t>
             </a:fld>
             <a:endParaRPr lang="en-US"/>
           </a:p>
@@ -3879,6 +3888,110 @@
           <p:cNvPr id="2" name="Title 1">
             <a:extLst>
               <a:ext uri="{FF2B5EF4-FFF2-40B4-BE49-F238E27FC236}">
+                <a16:creationId xmlns:a16="http://schemas.microsoft.com/office/drawing/2014/main" id="{1A01B874-613E-0498-3EF1-5AFA7CD40D9A}"/>
+              </a:ext>
+            </a:extLst>
+          </p:cNvPr>
+          <p:cNvSpPr>
+            <a:spLocks noGrp="1"/>
+          </p:cNvSpPr>
+          <p:nvPr>
+            <p:ph type="title"/>
+          </p:nvPr>
+        </p:nvSpPr>
+        <p:spPr/>
+        <p:txBody>
+          <a:bodyPr/>
+          <a:lstStyle/>
+          <a:p>
+            <a:r>
+              <a:rPr lang="en-US" dirty="0"/>
+              <a:t>Programming Software</a:t>
+            </a:r>
+          </a:p>
+        </p:txBody>
+      </p:sp>
+      <p:sp>
+        <p:nvSpPr>
+          <p:cNvPr id="3" name="Content Placeholder 2">
+            <a:extLst>
+              <a:ext uri="{FF2B5EF4-FFF2-40B4-BE49-F238E27FC236}">
+                <a16:creationId xmlns:a16="http://schemas.microsoft.com/office/drawing/2014/main" id="{D82795BD-CB81-05D6-9707-1532E3094DAA}"/>
+              </a:ext>
+            </a:extLst>
+          </p:cNvPr>
+          <p:cNvSpPr>
+            <a:spLocks noGrp="1"/>
+          </p:cNvSpPr>
+          <p:nvPr>
+            <p:ph idx="1"/>
+          </p:nvPr>
+        </p:nvSpPr>
+        <p:spPr/>
+        <p:txBody>
+          <a:bodyPr/>
+          <a:lstStyle/>
+          <a:p>
+            <a:r>
+              <a:rPr lang="en-US" dirty="0"/>
+              <a:t>Compiler</a:t>
+            </a:r>
+          </a:p>
+          <a:p>
+            <a:r>
+              <a:rPr lang="en-US" dirty="0"/>
+              <a:t>Interpreter</a:t>
+            </a:r>
+          </a:p>
+          <a:p>
+            <a:r>
+              <a:rPr lang="en-US" dirty="0"/>
+              <a:t>Emulator</a:t>
+            </a:r>
+          </a:p>
+          <a:p>
+            <a:r>
+              <a:rPr lang="en-US" dirty="0"/>
+              <a:t>Virtualization</a:t>
+            </a:r>
+          </a:p>
+        </p:txBody>
+      </p:sp>
+    </p:spTree>
+    <p:extLst>
+      <p:ext uri="{BB962C8B-B14F-4D97-AF65-F5344CB8AC3E}">
+        <p14:creationId xmlns:p14="http://schemas.microsoft.com/office/powerpoint/2010/main" val="3130494079"/>
+      </p:ext>
+    </p:extLst>
+  </p:cSld>
+  <p:clrMapOvr>
+    <a:masterClrMapping/>
+  </p:clrMapOvr>
+</p:sld>
+</file>
+
+<file path=ppt/slides/slide11.xml><?xml version="1.0" encoding="utf-8"?>
+<p:sld xmlns:a="http://schemas.openxmlformats.org/drawingml/2006/main" xmlns:r="http://schemas.openxmlformats.org/officeDocument/2006/relationships" xmlns:p="http://schemas.openxmlformats.org/presentationml/2006/main">
+  <p:cSld>
+    <p:spTree>
+      <p:nvGrpSpPr>
+        <p:cNvPr id="1" name=""/>
+        <p:cNvGrpSpPr/>
+        <p:nvPr/>
+      </p:nvGrpSpPr>
+      <p:grpSpPr>
+        <a:xfrm>
+          <a:off x="0" y="0"/>
+          <a:ext cx="0" cy="0"/>
+          <a:chOff x="0" y="0"/>
+          <a:chExt cx="0" cy="0"/>
+        </a:xfrm>
+      </p:grpSpPr>
+      <p:sp>
+        <p:nvSpPr>
+          <p:cNvPr id="2" name="Title 1">
+            <a:extLst>
+              <a:ext uri="{FF2B5EF4-FFF2-40B4-BE49-F238E27FC236}">
                 <a16:creationId xmlns:a16="http://schemas.microsoft.com/office/drawing/2014/main" id="{E7C1CF79-720B-078A-D0BC-383C99C547F6}"/>
               </a:ext>
             </a:extLst>
@@ -3931,6 +4044,812 @@
     <p:extLst>
       <p:ext uri="{BB962C8B-B14F-4D97-AF65-F5344CB8AC3E}">
         <p14:creationId xmlns:p14="http://schemas.microsoft.com/office/powerpoint/2010/main" val="2371237158"/>
+      </p:ext>
+    </p:extLst>
+  </p:cSld>
+  <p:clrMapOvr>
+    <a:masterClrMapping/>
+  </p:clrMapOvr>
+</p:sld>
+</file>
+
+<file path=ppt/slides/slide12.xml><?xml version="1.0" encoding="utf-8"?>
+<p:sld xmlns:a="http://schemas.openxmlformats.org/drawingml/2006/main" xmlns:r="http://schemas.openxmlformats.org/officeDocument/2006/relationships" xmlns:p="http://schemas.openxmlformats.org/presentationml/2006/main">
+  <p:cSld>
+    <p:spTree>
+      <p:nvGrpSpPr>
+        <p:cNvPr id="1" name=""/>
+        <p:cNvGrpSpPr/>
+        <p:nvPr/>
+      </p:nvGrpSpPr>
+      <p:grpSpPr>
+        <a:xfrm>
+          <a:off x="0" y="0"/>
+          <a:ext cx="0" cy="0"/>
+          <a:chOff x="0" y="0"/>
+          <a:chExt cx="0" cy="0"/>
+        </a:xfrm>
+      </p:grpSpPr>
+      <p:sp>
+        <p:nvSpPr>
+          <p:cNvPr id="2" name="Title 1">
+            <a:extLst>
+              <a:ext uri="{FF2B5EF4-FFF2-40B4-BE49-F238E27FC236}">
+                <a16:creationId xmlns:a16="http://schemas.microsoft.com/office/drawing/2014/main" id="{5C70FEA2-0AFF-1BD8-EA7E-B5CB24BC1405}"/>
+              </a:ext>
+            </a:extLst>
+          </p:cNvPr>
+          <p:cNvSpPr>
+            <a:spLocks noGrp="1"/>
+          </p:cNvSpPr>
+          <p:nvPr>
+            <p:ph type="title"/>
+          </p:nvPr>
+        </p:nvSpPr>
+        <p:spPr/>
+        <p:txBody>
+          <a:bodyPr/>
+          <a:lstStyle/>
+          <a:p>
+            <a:r>
+              <a:rPr lang="en-US" dirty="0"/>
+              <a:t>How CC4E works</a:t>
+            </a:r>
+          </a:p>
+        </p:txBody>
+      </p:sp>
+      <p:sp>
+        <p:nvSpPr>
+          <p:cNvPr id="3" name="Content Placeholder 2">
+            <a:extLst>
+              <a:ext uri="{FF2B5EF4-FFF2-40B4-BE49-F238E27FC236}">
+                <a16:creationId xmlns:a16="http://schemas.microsoft.com/office/drawing/2014/main" id="{EF093639-7211-C980-2DF7-BBF13B18D967}"/>
+              </a:ext>
+            </a:extLst>
+          </p:cNvPr>
+          <p:cNvSpPr>
+            <a:spLocks noGrp="1"/>
+          </p:cNvSpPr>
+          <p:nvPr>
+            <p:ph idx="1"/>
+          </p:nvPr>
+        </p:nvSpPr>
+        <p:spPr/>
+        <p:txBody>
+          <a:bodyPr/>
+          <a:lstStyle/>
+          <a:p>
+            <a:r>
+              <a:rPr lang="en-US" dirty="0"/>
+              <a:t>Compiler (in the server) compiles C code to WASM</a:t>
+            </a:r>
+          </a:p>
+          <a:p>
+            <a:r>
+              <a:rPr lang="en-US" dirty="0"/>
+              <a:t>HTML page downloads WASM </a:t>
+            </a:r>
+          </a:p>
+          <a:p>
+            <a:r>
+              <a:rPr lang="en-US" dirty="0"/>
+              <a:t>The built in WASM emulator runs it in the browser</a:t>
+            </a:r>
+          </a:p>
+          <a:p>
+            <a:endParaRPr lang="en-US" dirty="0"/>
+          </a:p>
+        </p:txBody>
+      </p:sp>
+    </p:spTree>
+    <p:extLst>
+      <p:ext uri="{BB962C8B-B14F-4D97-AF65-F5344CB8AC3E}">
+        <p14:creationId xmlns:p14="http://schemas.microsoft.com/office/powerpoint/2010/main" val="3862257423"/>
+      </p:ext>
+    </p:extLst>
+  </p:cSld>
+  <p:clrMapOvr>
+    <a:masterClrMapping/>
+  </p:clrMapOvr>
+</p:sld>
+</file>
+
+<file path=ppt/slides/slide13.xml><?xml version="1.0" encoding="utf-8"?>
+<p:sld xmlns:a="http://schemas.openxmlformats.org/drawingml/2006/main" xmlns:r="http://schemas.openxmlformats.org/officeDocument/2006/relationships" xmlns:p="http://schemas.openxmlformats.org/presentationml/2006/main">
+  <p:cSld>
+    <p:spTree>
+      <p:nvGrpSpPr>
+        <p:cNvPr id="1" name=""/>
+        <p:cNvGrpSpPr/>
+        <p:nvPr/>
+      </p:nvGrpSpPr>
+      <p:grpSpPr>
+        <a:xfrm>
+          <a:off x="0" y="0"/>
+          <a:ext cx="0" cy="0"/>
+          <a:chOff x="0" y="0"/>
+          <a:chExt cx="0" cy="0"/>
+        </a:xfrm>
+      </p:grpSpPr>
+      <p:sp>
+        <p:nvSpPr>
+          <p:cNvPr id="2" name="Title 1">
+            <a:extLst>
+              <a:ext uri="{FF2B5EF4-FFF2-40B4-BE49-F238E27FC236}">
+                <a16:creationId xmlns:a16="http://schemas.microsoft.com/office/drawing/2014/main" id="{37FB2521-31E1-83BE-C7F6-0DFD6293ADDA}"/>
+              </a:ext>
+            </a:extLst>
+          </p:cNvPr>
+          <p:cNvSpPr>
+            <a:spLocks noGrp="1"/>
+          </p:cNvSpPr>
+          <p:nvPr>
+            <p:ph type="title"/>
+          </p:nvPr>
+        </p:nvSpPr>
+        <p:spPr/>
+        <p:txBody>
+          <a:bodyPr/>
+          <a:lstStyle/>
+          <a:p>
+            <a:r>
+              <a:rPr lang="en-US" dirty="0"/>
+              <a:t>Python Runtime</a:t>
+            </a:r>
+          </a:p>
+        </p:txBody>
+      </p:sp>
+      <p:sp>
+        <p:nvSpPr>
+          <p:cNvPr id="3" name="Content Placeholder 2">
+            <a:extLst>
+              <a:ext uri="{FF2B5EF4-FFF2-40B4-BE49-F238E27FC236}">
+                <a16:creationId xmlns:a16="http://schemas.microsoft.com/office/drawing/2014/main" id="{B1989BFE-A74E-5D92-84A9-2C2BCCC09EE5}"/>
+              </a:ext>
+            </a:extLst>
+          </p:cNvPr>
+          <p:cNvSpPr>
+            <a:spLocks noGrp="1"/>
+          </p:cNvSpPr>
+          <p:nvPr>
+            <p:ph idx="1"/>
+          </p:nvPr>
+        </p:nvSpPr>
+        <p:spPr/>
+        <p:txBody>
+          <a:bodyPr/>
+          <a:lstStyle/>
+          <a:p>
+            <a:r>
+              <a:rPr lang="en-US" dirty="0"/>
+              <a:t>Python</a:t>
+            </a:r>
+          </a:p>
+          <a:p>
+            <a:r>
+              <a:rPr lang="en-US" dirty="0"/>
+              <a:t>Kind of Hybrid for performance reasons</a:t>
+            </a:r>
+          </a:p>
+          <a:p>
+            <a:r>
+              <a:rPr lang="en-US" dirty="0"/>
+              <a:t>__</a:t>
+            </a:r>
+            <a:r>
+              <a:rPr lang="en-US" dirty="0" err="1"/>
+              <a:t>pycache</a:t>
+            </a:r>
+            <a:r>
+              <a:rPr lang="en-US" dirty="0"/>
+              <a:t>__ ( byte code)</a:t>
+            </a:r>
+          </a:p>
+          <a:p>
+            <a:endParaRPr lang="en-US" dirty="0"/>
+          </a:p>
+        </p:txBody>
+      </p:sp>
+    </p:spTree>
+    <p:extLst>
+      <p:ext uri="{BB962C8B-B14F-4D97-AF65-F5344CB8AC3E}">
+        <p14:creationId xmlns:p14="http://schemas.microsoft.com/office/powerpoint/2010/main" val="3423991403"/>
+      </p:ext>
+    </p:extLst>
+  </p:cSld>
+  <p:clrMapOvr>
+    <a:masterClrMapping/>
+  </p:clrMapOvr>
+</p:sld>
+</file>
+
+<file path=ppt/slides/slide14.xml><?xml version="1.0" encoding="utf-8"?>
+<p:sld xmlns:a="http://schemas.openxmlformats.org/drawingml/2006/main" xmlns:r="http://schemas.openxmlformats.org/officeDocument/2006/relationships" xmlns:p="http://schemas.openxmlformats.org/presentationml/2006/main">
+  <p:cSld>
+    <p:spTree>
+      <p:nvGrpSpPr>
+        <p:cNvPr id="1" name=""/>
+        <p:cNvGrpSpPr/>
+        <p:nvPr/>
+      </p:nvGrpSpPr>
+      <p:grpSpPr>
+        <a:xfrm>
+          <a:off x="0" y="0"/>
+          <a:ext cx="0" cy="0"/>
+          <a:chOff x="0" y="0"/>
+          <a:chExt cx="0" cy="0"/>
+        </a:xfrm>
+      </p:grpSpPr>
+      <p:sp>
+        <p:nvSpPr>
+          <p:cNvPr id="2" name="Title 1">
+            <a:extLst>
+              <a:ext uri="{FF2B5EF4-FFF2-40B4-BE49-F238E27FC236}">
+                <a16:creationId xmlns:a16="http://schemas.microsoft.com/office/drawing/2014/main" id="{ACBF2ED3-4EB8-47D2-07FA-2FF18C34F829}"/>
+              </a:ext>
+            </a:extLst>
+          </p:cNvPr>
+          <p:cNvSpPr>
+            <a:spLocks noGrp="1"/>
+          </p:cNvSpPr>
+          <p:nvPr>
+            <p:ph type="title"/>
+          </p:nvPr>
+        </p:nvSpPr>
+        <p:spPr/>
+        <p:txBody>
+          <a:bodyPr/>
+          <a:lstStyle/>
+          <a:p>
+            <a:r>
+              <a:rPr lang="en-US" dirty="0"/>
+              <a:t>JavaScript Runtime</a:t>
+            </a:r>
+          </a:p>
+        </p:txBody>
+      </p:sp>
+      <p:sp>
+        <p:nvSpPr>
+          <p:cNvPr id="3" name="Content Placeholder 2">
+            <a:extLst>
+              <a:ext uri="{FF2B5EF4-FFF2-40B4-BE49-F238E27FC236}">
+                <a16:creationId xmlns:a16="http://schemas.microsoft.com/office/drawing/2014/main" id="{864C8F1E-3D85-D87D-8F38-6695C15A57DC}"/>
+              </a:ext>
+            </a:extLst>
+          </p:cNvPr>
+          <p:cNvSpPr>
+            <a:spLocks noGrp="1"/>
+          </p:cNvSpPr>
+          <p:nvPr>
+            <p:ph idx="1"/>
+          </p:nvPr>
+        </p:nvSpPr>
+        <p:spPr/>
+        <p:txBody>
+          <a:bodyPr/>
+          <a:lstStyle/>
+          <a:p>
+            <a:endParaRPr lang="en-US"/>
+          </a:p>
+        </p:txBody>
+      </p:sp>
+    </p:spTree>
+    <p:extLst>
+      <p:ext uri="{BB962C8B-B14F-4D97-AF65-F5344CB8AC3E}">
+        <p14:creationId xmlns:p14="http://schemas.microsoft.com/office/powerpoint/2010/main" val="3740524336"/>
+      </p:ext>
+    </p:extLst>
+  </p:cSld>
+  <p:clrMapOvr>
+    <a:masterClrMapping/>
+  </p:clrMapOvr>
+</p:sld>
+</file>
+
+<file path=ppt/slides/slide15.xml><?xml version="1.0" encoding="utf-8"?>
+<p:sld xmlns:a="http://schemas.openxmlformats.org/drawingml/2006/main" xmlns:r="http://schemas.openxmlformats.org/officeDocument/2006/relationships" xmlns:p="http://schemas.openxmlformats.org/presentationml/2006/main">
+  <p:cSld>
+    <p:spTree>
+      <p:nvGrpSpPr>
+        <p:cNvPr id="1" name=""/>
+        <p:cNvGrpSpPr/>
+        <p:nvPr/>
+      </p:nvGrpSpPr>
+      <p:grpSpPr>
+        <a:xfrm>
+          <a:off x="0" y="0"/>
+          <a:ext cx="0" cy="0"/>
+          <a:chOff x="0" y="0"/>
+          <a:chExt cx="0" cy="0"/>
+        </a:xfrm>
+      </p:grpSpPr>
+      <p:sp>
+        <p:nvSpPr>
+          <p:cNvPr id="2" name="Title 1">
+            <a:extLst>
+              <a:ext uri="{FF2B5EF4-FFF2-40B4-BE49-F238E27FC236}">
+                <a16:creationId xmlns:a16="http://schemas.microsoft.com/office/drawing/2014/main" id="{1C06987B-4B31-B630-9D96-F5C6D3A013C0}"/>
+              </a:ext>
+            </a:extLst>
+          </p:cNvPr>
+          <p:cNvSpPr>
+            <a:spLocks noGrp="1"/>
+          </p:cNvSpPr>
+          <p:nvPr>
+            <p:ph type="title"/>
+          </p:nvPr>
+        </p:nvSpPr>
+        <p:spPr/>
+        <p:txBody>
+          <a:bodyPr/>
+          <a:lstStyle/>
+          <a:p>
+            <a:r>
+              <a:rPr lang="en-US" dirty="0"/>
+              <a:t>Java Runtime</a:t>
+            </a:r>
+          </a:p>
+        </p:txBody>
+      </p:sp>
+      <p:sp>
+        <p:nvSpPr>
+          <p:cNvPr id="3" name="Content Placeholder 2">
+            <a:extLst>
+              <a:ext uri="{FF2B5EF4-FFF2-40B4-BE49-F238E27FC236}">
+                <a16:creationId xmlns:a16="http://schemas.microsoft.com/office/drawing/2014/main" id="{A3B30385-FDFB-F703-E7AA-76E71F0C384A}"/>
+              </a:ext>
+            </a:extLst>
+          </p:cNvPr>
+          <p:cNvSpPr>
+            <a:spLocks noGrp="1"/>
+          </p:cNvSpPr>
+          <p:nvPr>
+            <p:ph idx="1"/>
+          </p:nvPr>
+        </p:nvSpPr>
+        <p:spPr/>
+        <p:txBody>
+          <a:bodyPr/>
+          <a:lstStyle/>
+          <a:p>
+            <a:r>
+              <a:rPr lang="en-US" dirty="0"/>
+              <a:t>Traditional compiler to "byte code"</a:t>
+            </a:r>
+          </a:p>
+          <a:p>
+            <a:pPr lvl="1"/>
+            <a:r>
+              <a:rPr lang="en-US" dirty="0" err="1"/>
+              <a:t>javac</a:t>
+            </a:r>
+            <a:r>
+              <a:rPr lang="en-US" dirty="0"/>
+              <a:t> </a:t>
+            </a:r>
+            <a:r>
+              <a:rPr lang="en-US" dirty="0" err="1"/>
+              <a:t>hello.java</a:t>
+            </a:r>
+            <a:r>
+              <a:rPr lang="en-US" dirty="0"/>
+              <a:t> -&gt; </a:t>
+            </a:r>
+            <a:r>
+              <a:rPr lang="en-US" dirty="0" err="1"/>
+              <a:t>hello.class</a:t>
+            </a:r>
+            <a:endParaRPr lang="en-US" dirty="0"/>
+          </a:p>
+          <a:p>
+            <a:r>
+              <a:rPr lang="en-US" dirty="0"/>
+              <a:t>Java virtual machine (JVM) runtime – byte code emulator</a:t>
+            </a:r>
+          </a:p>
+          <a:p>
+            <a:pPr lvl="1"/>
+            <a:r>
+              <a:rPr lang="en-US" dirty="0"/>
+              <a:t>java </a:t>
+            </a:r>
+            <a:r>
+              <a:rPr lang="en-US" dirty="0" err="1"/>
+              <a:t>hello.class</a:t>
+            </a:r>
+            <a:endParaRPr lang="en-US" dirty="0"/>
+          </a:p>
+          <a:p>
+            <a:r>
+              <a:rPr lang="en-US" dirty="0"/>
+              <a:t>Just in time (JIT) compiler (a.k.a. Hotspot compiler)</a:t>
+            </a:r>
+          </a:p>
+          <a:p>
+            <a:r>
+              <a:rPr lang="en-US" dirty="0"/>
+              <a:t>JVM supports multiple languages</a:t>
+            </a:r>
+          </a:p>
+          <a:p>
+            <a:pPr lvl="1"/>
+            <a:r>
+              <a:rPr lang="en-US" dirty="0"/>
+              <a:t>Scala …</a:t>
+            </a:r>
+          </a:p>
+        </p:txBody>
+      </p:sp>
+    </p:spTree>
+    <p:extLst>
+      <p:ext uri="{BB962C8B-B14F-4D97-AF65-F5344CB8AC3E}">
+        <p14:creationId xmlns:p14="http://schemas.microsoft.com/office/powerpoint/2010/main" val="750224463"/>
+      </p:ext>
+    </p:extLst>
+  </p:cSld>
+  <p:clrMapOvr>
+    <a:masterClrMapping/>
+  </p:clrMapOvr>
+</p:sld>
+</file>
+
+<file path=ppt/slides/slide16.xml><?xml version="1.0" encoding="utf-8"?>
+<p:sld xmlns:a="http://schemas.openxmlformats.org/drawingml/2006/main" xmlns:r="http://schemas.openxmlformats.org/officeDocument/2006/relationships" xmlns:p="http://schemas.openxmlformats.org/presentationml/2006/main">
+  <p:cSld>
+    <p:spTree>
+      <p:nvGrpSpPr>
+        <p:cNvPr id="1" name=""/>
+        <p:cNvGrpSpPr/>
+        <p:nvPr/>
+      </p:nvGrpSpPr>
+      <p:grpSpPr>
+        <a:xfrm>
+          <a:off x="0" y="0"/>
+          <a:ext cx="0" cy="0"/>
+          <a:chOff x="0" y="0"/>
+          <a:chExt cx="0" cy="0"/>
+        </a:xfrm>
+      </p:grpSpPr>
+      <p:sp>
+        <p:nvSpPr>
+          <p:cNvPr id="2" name="Title 1">
+            <a:extLst>
+              <a:ext uri="{FF2B5EF4-FFF2-40B4-BE49-F238E27FC236}">
+                <a16:creationId xmlns:a16="http://schemas.microsoft.com/office/drawing/2014/main" id="{0CEF55A7-1A8E-45F1-4550-9F5ED53B8353}"/>
+              </a:ext>
+            </a:extLst>
+          </p:cNvPr>
+          <p:cNvSpPr>
+            <a:spLocks noGrp="1"/>
+          </p:cNvSpPr>
+          <p:nvPr>
+            <p:ph type="title"/>
+          </p:nvPr>
+        </p:nvSpPr>
+        <p:spPr/>
+        <p:txBody>
+          <a:bodyPr/>
+          <a:lstStyle/>
+          <a:p>
+            <a:r>
+              <a:rPr lang="en-US" dirty="0"/>
+              <a:t>PHP runtime</a:t>
+            </a:r>
+          </a:p>
+        </p:txBody>
+      </p:sp>
+      <p:sp>
+        <p:nvSpPr>
+          <p:cNvPr id="3" name="Content Placeholder 2">
+            <a:extLst>
+              <a:ext uri="{FF2B5EF4-FFF2-40B4-BE49-F238E27FC236}">
+                <a16:creationId xmlns:a16="http://schemas.microsoft.com/office/drawing/2014/main" id="{B62C8F53-EAEC-1F4A-BAE6-FFC3EA574A2F}"/>
+              </a:ext>
+            </a:extLst>
+          </p:cNvPr>
+          <p:cNvSpPr>
+            <a:spLocks noGrp="1"/>
+          </p:cNvSpPr>
+          <p:nvPr>
+            <p:ph idx="1"/>
+          </p:nvPr>
+        </p:nvSpPr>
+        <p:spPr/>
+        <p:txBody>
+          <a:bodyPr/>
+          <a:lstStyle/>
+          <a:p>
+            <a:endParaRPr lang="en-US"/>
+          </a:p>
+        </p:txBody>
+      </p:sp>
+    </p:spTree>
+    <p:extLst>
+      <p:ext uri="{BB962C8B-B14F-4D97-AF65-F5344CB8AC3E}">
+        <p14:creationId xmlns:p14="http://schemas.microsoft.com/office/powerpoint/2010/main" val="2943985763"/>
+      </p:ext>
+    </p:extLst>
+  </p:cSld>
+  <p:clrMapOvr>
+    <a:masterClrMapping/>
+  </p:clrMapOvr>
+</p:sld>
+</file>
+
+<file path=ppt/slides/slide17.xml><?xml version="1.0" encoding="utf-8"?>
+<p:sld xmlns:a="http://schemas.openxmlformats.org/drawingml/2006/main" xmlns:r="http://schemas.openxmlformats.org/officeDocument/2006/relationships" xmlns:p="http://schemas.openxmlformats.org/presentationml/2006/main">
+  <p:cSld>
+    <p:spTree>
+      <p:nvGrpSpPr>
+        <p:cNvPr id="1" name=""/>
+        <p:cNvGrpSpPr/>
+        <p:nvPr/>
+      </p:nvGrpSpPr>
+      <p:grpSpPr>
+        <a:xfrm>
+          <a:off x="0" y="0"/>
+          <a:ext cx="0" cy="0"/>
+          <a:chOff x="0" y="0"/>
+          <a:chExt cx="0" cy="0"/>
+        </a:xfrm>
+      </p:grpSpPr>
+      <p:sp>
+        <p:nvSpPr>
+          <p:cNvPr id="2" name="Title 1">
+            <a:extLst>
+              <a:ext uri="{FF2B5EF4-FFF2-40B4-BE49-F238E27FC236}">
+                <a16:creationId xmlns:a16="http://schemas.microsoft.com/office/drawing/2014/main" id="{E40DFDAC-04BA-0A0E-E859-9C13175F635B}"/>
+              </a:ext>
+            </a:extLst>
+          </p:cNvPr>
+          <p:cNvSpPr>
+            <a:spLocks noGrp="1"/>
+          </p:cNvSpPr>
+          <p:nvPr>
+            <p:ph type="title"/>
+          </p:nvPr>
+        </p:nvSpPr>
+        <p:spPr/>
+        <p:txBody>
+          <a:bodyPr/>
+          <a:lstStyle/>
+          <a:p>
+            <a:r>
+              <a:rPr lang="en-US" dirty="0"/>
+              <a:t>Interpreter</a:t>
+            </a:r>
+          </a:p>
+        </p:txBody>
+      </p:sp>
+      <p:sp>
+        <p:nvSpPr>
+          <p:cNvPr id="3" name="Content Placeholder 2">
+            <a:extLst>
+              <a:ext uri="{FF2B5EF4-FFF2-40B4-BE49-F238E27FC236}">
+                <a16:creationId xmlns:a16="http://schemas.microsoft.com/office/drawing/2014/main" id="{AA59729C-3E4E-FAD5-8CB9-7DA498AD43C5}"/>
+              </a:ext>
+            </a:extLst>
+          </p:cNvPr>
+          <p:cNvSpPr>
+            <a:spLocks noGrp="1"/>
+          </p:cNvSpPr>
+          <p:nvPr>
+            <p:ph idx="1"/>
+          </p:nvPr>
+        </p:nvSpPr>
+        <p:spPr/>
+        <p:txBody>
+          <a:bodyPr/>
+          <a:lstStyle/>
+          <a:p>
+            <a:endParaRPr lang="en-US" dirty="0"/>
+          </a:p>
+        </p:txBody>
+      </p:sp>
+    </p:spTree>
+    <p:extLst>
+      <p:ext uri="{BB962C8B-B14F-4D97-AF65-F5344CB8AC3E}">
+        <p14:creationId xmlns:p14="http://schemas.microsoft.com/office/powerpoint/2010/main" val="3183535237"/>
+      </p:ext>
+    </p:extLst>
+  </p:cSld>
+  <p:clrMapOvr>
+    <a:masterClrMapping/>
+  </p:clrMapOvr>
+</p:sld>
+</file>
+
+<file path=ppt/slides/slide18.xml><?xml version="1.0" encoding="utf-8"?>
+<p:sld xmlns:a="http://schemas.openxmlformats.org/drawingml/2006/main" xmlns:r="http://schemas.openxmlformats.org/officeDocument/2006/relationships" xmlns:p="http://schemas.openxmlformats.org/presentationml/2006/main">
+  <p:cSld>
+    <p:spTree>
+      <p:nvGrpSpPr>
+        <p:cNvPr id="1" name=""/>
+        <p:cNvGrpSpPr/>
+        <p:nvPr/>
+      </p:nvGrpSpPr>
+      <p:grpSpPr>
+        <a:xfrm>
+          <a:off x="0" y="0"/>
+          <a:ext cx="0" cy="0"/>
+          <a:chOff x="0" y="0"/>
+          <a:chExt cx="0" cy="0"/>
+        </a:xfrm>
+      </p:grpSpPr>
+      <p:sp>
+        <p:nvSpPr>
+          <p:cNvPr id="4" name="Title 3">
+            <a:extLst>
+              <a:ext uri="{FF2B5EF4-FFF2-40B4-BE49-F238E27FC236}">
+                <a16:creationId xmlns:a16="http://schemas.microsoft.com/office/drawing/2014/main" id="{408E3B30-9842-CD75-D02D-3C0AB6FE0289}"/>
+              </a:ext>
+            </a:extLst>
+          </p:cNvPr>
+          <p:cNvSpPr>
+            <a:spLocks noGrp="1"/>
+          </p:cNvSpPr>
+          <p:nvPr>
+            <p:ph type="title"/>
+          </p:nvPr>
+        </p:nvSpPr>
+        <p:spPr/>
+        <p:txBody>
+          <a:bodyPr/>
+          <a:lstStyle/>
+          <a:p>
+            <a:r>
+              <a:rPr lang="en-US" dirty="0"/>
+              <a:t>Virtualization</a:t>
+            </a:r>
+          </a:p>
+        </p:txBody>
+      </p:sp>
+      <p:sp>
+        <p:nvSpPr>
+          <p:cNvPr id="5" name="Text Placeholder 4">
+            <a:extLst>
+              <a:ext uri="{FF2B5EF4-FFF2-40B4-BE49-F238E27FC236}">
+                <a16:creationId xmlns:a16="http://schemas.microsoft.com/office/drawing/2014/main" id="{96A039B7-1D10-432D-56A4-6E957517FB0F}"/>
+              </a:ext>
+            </a:extLst>
+          </p:cNvPr>
+          <p:cNvSpPr>
+            <a:spLocks noGrp="1"/>
+          </p:cNvSpPr>
+          <p:nvPr>
+            <p:ph type="body" idx="1"/>
+          </p:nvPr>
+        </p:nvSpPr>
+        <p:spPr/>
+        <p:txBody>
+          <a:bodyPr/>
+          <a:lstStyle/>
+          <a:p>
+            <a:endParaRPr lang="en-US"/>
+          </a:p>
+        </p:txBody>
+      </p:sp>
+    </p:spTree>
+    <p:extLst>
+      <p:ext uri="{BB962C8B-B14F-4D97-AF65-F5344CB8AC3E}">
+        <p14:creationId xmlns:p14="http://schemas.microsoft.com/office/powerpoint/2010/main" val="1037398776"/>
+      </p:ext>
+    </p:extLst>
+  </p:cSld>
+  <p:clrMapOvr>
+    <a:masterClrMapping/>
+  </p:clrMapOvr>
+</p:sld>
+</file>
+
+<file path=ppt/slides/slide19.xml><?xml version="1.0" encoding="utf-8"?>
+<p:sld xmlns:a="http://schemas.openxmlformats.org/drawingml/2006/main" xmlns:r="http://schemas.openxmlformats.org/officeDocument/2006/relationships" xmlns:p="http://schemas.openxmlformats.org/presentationml/2006/main">
+  <p:cSld>
+    <p:spTree>
+      <p:nvGrpSpPr>
+        <p:cNvPr id="1" name=""/>
+        <p:cNvGrpSpPr/>
+        <p:nvPr/>
+      </p:nvGrpSpPr>
+      <p:grpSpPr>
+        <a:xfrm>
+          <a:off x="0" y="0"/>
+          <a:ext cx="0" cy="0"/>
+          <a:chOff x="0" y="0"/>
+          <a:chExt cx="0" cy="0"/>
+        </a:xfrm>
+      </p:grpSpPr>
+      <p:sp>
+        <p:nvSpPr>
+          <p:cNvPr id="4" name="Title 3">
+            <a:extLst>
+              <a:ext uri="{FF2B5EF4-FFF2-40B4-BE49-F238E27FC236}">
+                <a16:creationId xmlns:a16="http://schemas.microsoft.com/office/drawing/2014/main" id="{72BCC3BF-B65D-22E0-EE7A-B2B69253C06A}"/>
+              </a:ext>
+            </a:extLst>
+          </p:cNvPr>
+          <p:cNvSpPr>
+            <a:spLocks noGrp="1"/>
+          </p:cNvSpPr>
+          <p:nvPr>
+            <p:ph type="title"/>
+          </p:nvPr>
+        </p:nvSpPr>
+        <p:spPr/>
+        <p:txBody>
+          <a:bodyPr/>
+          <a:lstStyle/>
+          <a:p>
+            <a:r>
+              <a:rPr lang="en-US" dirty="0"/>
+              <a:t>Virtualization</a:t>
+            </a:r>
+          </a:p>
+        </p:txBody>
+      </p:sp>
+      <p:sp>
+        <p:nvSpPr>
+          <p:cNvPr id="5" name="Content Placeholder 4">
+            <a:extLst>
+              <a:ext uri="{FF2B5EF4-FFF2-40B4-BE49-F238E27FC236}">
+                <a16:creationId xmlns:a16="http://schemas.microsoft.com/office/drawing/2014/main" id="{BBE7C797-9F5B-A597-6D54-FD3265B88D04}"/>
+              </a:ext>
+            </a:extLst>
+          </p:cNvPr>
+          <p:cNvSpPr>
+            <a:spLocks noGrp="1"/>
+          </p:cNvSpPr>
+          <p:nvPr>
+            <p:ph idx="1"/>
+          </p:nvPr>
+        </p:nvSpPr>
+        <p:spPr/>
+        <p:txBody>
+          <a:bodyPr/>
+          <a:lstStyle/>
+          <a:p>
+            <a:r>
+              <a:rPr lang="en-US" dirty="0"/>
+              <a:t>Modern CPUs have support for virtualization</a:t>
+            </a:r>
+          </a:p>
+          <a:p>
+            <a:r>
+              <a:rPr lang="en-US" dirty="0"/>
+              <a:t>CP/CMS</a:t>
+            </a:r>
+          </a:p>
+          <a:p>
+            <a:r>
+              <a:rPr lang="en-US" dirty="0"/>
+              <a:t>Parallels on Mac and Windows</a:t>
+            </a:r>
+          </a:p>
+          <a:p>
+            <a:r>
+              <a:rPr lang="en-US" dirty="0" err="1"/>
+              <a:t>Vmware</a:t>
+            </a:r>
+            <a:endParaRPr lang="en-US" dirty="0"/>
+          </a:p>
+          <a:p>
+            <a:r>
+              <a:rPr lang="en-US" dirty="0"/>
+              <a:t>Docker</a:t>
+            </a:r>
+          </a:p>
+          <a:p>
+            <a:r>
+              <a:rPr lang="en-US" dirty="0"/>
+              <a:t>VirtualBox (Oracle)</a:t>
+            </a:r>
+          </a:p>
+        </p:txBody>
+      </p:sp>
+    </p:spTree>
+    <p:extLst>
+      <p:ext uri="{BB962C8B-B14F-4D97-AF65-F5344CB8AC3E}">
+        <p14:creationId xmlns:p14="http://schemas.microsoft.com/office/powerpoint/2010/main" val="1529713462"/>
       </p:ext>
     </p:extLst>
   </p:cSld>

</xml_diff>